<commit_message>
Added twitter handle and github to ppt.
</commit_message>
<xml_diff>
--- a/Whimsy.pptx
+++ b/Whimsy.pptx
@@ -204,7 +204,6 @@
           </a:p>
         </c:rich>
       </c:tx>
-      <c:layout/>
       <c:overlay val="0"/>
       <c:spPr>
         <a:noFill/>
@@ -304,11 +303,11 @@
           <c:showBubbleSize val="0"/>
         </c:dLbls>
         <c:gapWidth val="182"/>
-        <c:axId val="-2020139376"/>
-        <c:axId val="-2020128128"/>
+        <c:axId val="-2012954640"/>
+        <c:axId val="-2012948304"/>
       </c:barChart>
       <c:catAx>
-        <c:axId val="-2020139376"/>
+        <c:axId val="-2012954640"/>
         <c:scaling>
           <c:orientation val="minMax"/>
         </c:scaling>
@@ -351,7 +350,7 @@
             <a:endParaRPr lang="en-US"/>
           </a:p>
         </c:txPr>
-        <c:crossAx val="-2020128128"/>
+        <c:crossAx val="-2012948304"/>
         <c:crosses val="autoZero"/>
         <c:auto val="1"/>
         <c:lblAlgn val="ctr"/>
@@ -359,7 +358,7 @@
         <c:noMultiLvlLbl val="0"/>
       </c:catAx>
       <c:valAx>
-        <c:axId val="-2020128128"/>
+        <c:axId val="-2012948304"/>
         <c:scaling>
           <c:orientation val="minMax"/>
         </c:scaling>
@@ -410,7 +409,7 @@
             <a:endParaRPr lang="en-US"/>
           </a:p>
         </c:txPr>
-        <c:crossAx val="-2020139376"/>
+        <c:crossAx val="-2012954640"/>
         <c:crosses val="autoZero"/>
         <c:crossBetween val="between"/>
       </c:valAx>
@@ -424,7 +423,6 @@
     </c:plotArea>
     <c:legend>
       <c:legendPos val="b"/>
-      <c:layout/>
       <c:overlay val="0"/>
       <c:spPr>
         <a:noFill/>
@@ -529,7 +527,6 @@
           </a:p>
         </c:rich>
       </c:tx>
-      <c:layout/>
       <c:overlay val="0"/>
       <c:spPr>
         <a:noFill/>
@@ -635,11 +632,11 @@
           <c:showBubbleSize val="0"/>
         </c:dLbls>
         <c:gapWidth val="182"/>
-        <c:axId val="2096508368"/>
-        <c:axId val="2096511232"/>
+        <c:axId val="-2139433536"/>
+        <c:axId val="-2139431360"/>
       </c:barChart>
       <c:catAx>
-        <c:axId val="2096508368"/>
+        <c:axId val="-2139433536"/>
         <c:scaling>
           <c:orientation val="minMax"/>
         </c:scaling>
@@ -682,7 +679,7 @@
             <a:endParaRPr lang="en-US"/>
           </a:p>
         </c:txPr>
-        <c:crossAx val="2096511232"/>
+        <c:crossAx val="-2139431360"/>
         <c:crosses val="autoZero"/>
         <c:auto val="1"/>
         <c:lblAlgn val="ctr"/>
@@ -690,7 +687,7 @@
         <c:noMultiLvlLbl val="0"/>
       </c:catAx>
       <c:valAx>
-        <c:axId val="2096511232"/>
+        <c:axId val="-2139431360"/>
         <c:scaling>
           <c:orientation val="minMax"/>
         </c:scaling>
@@ -741,7 +738,7 @@
             <a:endParaRPr lang="en-US"/>
           </a:p>
         </c:txPr>
-        <c:crossAx val="2096508368"/>
+        <c:crossAx val="-2139433536"/>
         <c:crosses val="autoZero"/>
         <c:crossBetween val="between"/>
       </c:valAx>
@@ -755,7 +752,6 @@
     </c:plotArea>
     <c:legend>
       <c:legendPos val="b"/>
-      <c:layout/>
       <c:overlay val="0"/>
       <c:spPr>
         <a:noFill/>
@@ -8800,6 +8796,41 @@
           <a:bodyPr/>
           <a:lstStyle/>
           <a:p>
+            <a:r>
+              <a:rPr lang="en-US" dirty="0" smtClean="0"/>
+              <a:t>Andrew Rademacher</a:t>
+            </a:r>
+          </a:p>
+          <a:p>
+            <a:pPr lvl="1"/>
+            <a:r>
+              <a:rPr lang="en-US" dirty="0" smtClean="0"/>
+              <a:t>@</a:t>
+            </a:r>
+            <a:r>
+              <a:rPr lang="en-US" dirty="0" err="1" smtClean="0"/>
+              <a:t>AndRademacher</a:t>
+            </a:r>
+            <a:endParaRPr lang="en-US" dirty="0" smtClean="0"/>
+          </a:p>
+          <a:p>
+            <a:pPr lvl="1"/>
+            <a:r>
+              <a:rPr lang="en-US" dirty="0"/>
+              <a:t>https://</a:t>
+            </a:r>
+            <a:r>
+              <a:rPr lang="en-US" dirty="0" err="1"/>
+              <a:t>github.com</a:t>
+            </a:r>
+            <a:r>
+              <a:rPr lang="en-US" dirty="0"/>
+              <a:t>/</a:t>
+            </a:r>
+            <a:r>
+              <a:rPr lang="en-US"/>
+              <a:t>AndrewRademacher</a:t>
+            </a:r>
             <a:endParaRPr lang="en-US"/>
           </a:p>
         </p:txBody>
@@ -25134,19 +25165,7 @@
           <a:p>
             <a:r>
               <a:rPr lang="en-US" dirty="0" smtClean="0"/>
-              <a:t>What </a:t>
-            </a:r>
-            <a:r>
-              <a:rPr lang="en-US" dirty="0" smtClean="0"/>
-              <a:t>do I </a:t>
-            </a:r>
-            <a:r>
-              <a:rPr lang="en-US" dirty="0" smtClean="0"/>
-              <a:t>mean </a:t>
-            </a:r>
-            <a:r>
-              <a:rPr lang="en-US" dirty="0" smtClean="0"/>
-              <a:t>by concurrency?</a:t>
+              <a:t>What do I mean by concurrency?</a:t>
             </a:r>
             <a:endParaRPr lang="en-US" dirty="0"/>
           </a:p>

</xml_diff>